<commit_message>
in middle of pop output
</commit_message>
<xml_diff>
--- a/Additional/Presentations/20240626PreExplorationMeeting.pptx
+++ b/Additional/Presentations/20240626PreExplorationMeeting.pptx
@@ -9554,7 +9554,7 @@
           <a:p>
             <a:fld id="{BF5DCE9E-1BB9-422F-BD86-429B81264EA3}" type="datetimeFigureOut">
               <a:rPr lang="en-IN" smtClean="0"/>
-              <a:t>26-06-2024</a:t>
+              <a:t>27-06-2024</a:t>
             </a:fld>
             <a:endParaRPr lang="en-IN"/>
           </a:p>
@@ -10410,7 +10410,7 @@
           <a:p>
             <a:fld id="{53698918-721C-41EB-A543-DCCB4BCD4EE1}" type="datetime1">
               <a:rPr lang="en-IN" smtClean="0"/>
-              <a:t>26-06-2024</a:t>
+              <a:t>27-06-2024</a:t>
             </a:fld>
             <a:endParaRPr lang="en-IN"/>
           </a:p>
@@ -10618,7 +10618,7 @@
           <a:p>
             <a:fld id="{31EAFC2E-7CD5-46D5-9B51-90A0A777C0FB}" type="datetime1">
               <a:rPr lang="en-IN" smtClean="0"/>
-              <a:t>26-06-2024</a:t>
+              <a:t>27-06-2024</a:t>
             </a:fld>
             <a:endParaRPr lang="en-IN"/>
           </a:p>
@@ -10836,7 +10836,7 @@
           <a:p>
             <a:fld id="{21DF4EEF-F77E-4DEF-9D59-E580134A0BFF}" type="datetime1">
               <a:rPr lang="en-IN" smtClean="0"/>
-              <a:t>26-06-2024</a:t>
+              <a:t>27-06-2024</a:t>
             </a:fld>
             <a:endParaRPr lang="en-IN"/>
           </a:p>
@@ -11066,7 +11066,7 @@
           <a:p>
             <a:fld id="{B60A30DB-D3DD-4171-87BA-58EE4B4D9D99}" type="datetime1">
               <a:rPr lang="en-IN" smtClean="0"/>
-              <a:t>26-06-2024</a:t>
+              <a:t>27-06-2024</a:t>
             </a:fld>
             <a:endParaRPr lang="en-IN"/>
           </a:p>
@@ -11274,7 +11274,7 @@
           <a:p>
             <a:fld id="{8FD7C09A-ED8C-42A3-8E89-745F787EBAE6}" type="datetime1">
               <a:rPr lang="en-IN" smtClean="0"/>
-              <a:t>26-06-2024</a:t>
+              <a:t>27-06-2024</a:t>
             </a:fld>
             <a:endParaRPr lang="en-IN"/>
           </a:p>
@@ -11558,7 +11558,7 @@
           <a:p>
             <a:fld id="{080BA975-D9F0-4269-A855-55AF444CC146}" type="datetime1">
               <a:rPr lang="en-IN" smtClean="0"/>
-              <a:t>26-06-2024</a:t>
+              <a:t>27-06-2024</a:t>
             </a:fld>
             <a:endParaRPr lang="en-IN"/>
           </a:p>
@@ -11834,7 +11834,7 @@
           <a:p>
             <a:fld id="{3F2FDCAA-38F5-4F11-8B45-AFF0D48CAE37}" type="datetime1">
               <a:rPr lang="en-IN" smtClean="0"/>
-              <a:t>26-06-2024</a:t>
+              <a:t>27-06-2024</a:t>
             </a:fld>
             <a:endParaRPr lang="en-IN"/>
           </a:p>
@@ -12257,7 +12257,7 @@
           <a:p>
             <a:fld id="{E67CD80F-0809-4D91-A685-81C43EC68BD7}" type="datetime1">
               <a:rPr lang="en-IN" smtClean="0"/>
-              <a:t>26-06-2024</a:t>
+              <a:t>27-06-2024</a:t>
             </a:fld>
             <a:endParaRPr lang="en-IN"/>
           </a:p>
@@ -12407,7 +12407,7 @@
           <a:p>
             <a:fld id="{0000C283-6B90-4B55-96AC-1FEC6760B80A}" type="datetime1">
               <a:rPr lang="en-IN" smtClean="0"/>
-              <a:t>26-06-2024</a:t>
+              <a:t>27-06-2024</a:t>
             </a:fld>
             <a:endParaRPr lang="en-IN"/>
           </a:p>
@@ -12528,7 +12528,7 @@
           <a:p>
             <a:fld id="{8DBD286D-3A68-4404-983E-98E32172149A}" type="datetime1">
               <a:rPr lang="en-IN" smtClean="0"/>
-              <a:t>26-06-2024</a:t>
+              <a:t>27-06-2024</a:t>
             </a:fld>
             <a:endParaRPr lang="en-IN"/>
           </a:p>
@@ -12849,7 +12849,7 @@
           <a:p>
             <a:fld id="{856FFEC3-933E-468C-B098-6AED721D74E5}" type="datetime1">
               <a:rPr lang="en-IN" smtClean="0"/>
-              <a:t>26-06-2024</a:t>
+              <a:t>27-06-2024</a:t>
             </a:fld>
             <a:endParaRPr lang="en-IN"/>
           </a:p>
@@ -13057,7 +13057,7 @@
           <a:p>
             <a:fld id="{7E9D746C-5244-48A8-8BA7-7C87D343C067}" type="datetime1">
               <a:rPr lang="en-IN" smtClean="0"/>
-              <a:t>26-06-2024</a:t>
+              <a:t>27-06-2024</a:t>
             </a:fld>
             <a:endParaRPr lang="en-IN"/>
           </a:p>
@@ -13354,7 +13354,7 @@
           <a:p>
             <a:fld id="{16D845DA-BC95-4479-A4D1-9EC39717A5ED}" type="datetime1">
               <a:rPr lang="en-IN" smtClean="0"/>
-              <a:t>26-06-2024</a:t>
+              <a:t>27-06-2024</a:t>
             </a:fld>
             <a:endParaRPr lang="en-IN"/>
           </a:p>
@@ -13562,7 +13562,7 @@
           <a:p>
             <a:fld id="{2EF65F16-D82D-408B-ACAD-B510466CBCE0}" type="datetime1">
               <a:rPr lang="en-IN" smtClean="0"/>
-              <a:t>26-06-2024</a:t>
+              <a:t>27-06-2024</a:t>
             </a:fld>
             <a:endParaRPr lang="en-IN"/>
           </a:p>
@@ -13780,7 +13780,7 @@
           <a:p>
             <a:fld id="{C11CDA68-76E6-4C65-B5F6-9692920ACB6D}" type="datetime1">
               <a:rPr lang="en-IN" smtClean="0"/>
-              <a:t>26-06-2024</a:t>
+              <a:t>27-06-2024</a:t>
             </a:fld>
             <a:endParaRPr lang="en-IN"/>
           </a:p>
@@ -14064,7 +14064,7 @@
           <a:p>
             <a:fld id="{D09F8160-02F9-4DCC-880C-850EDD8A9CA1}" type="datetime1">
               <a:rPr lang="en-IN" smtClean="0"/>
-              <a:t>26-06-2024</a:t>
+              <a:t>27-06-2024</a:t>
             </a:fld>
             <a:endParaRPr lang="en-IN"/>
           </a:p>
@@ -14340,7 +14340,7 @@
           <a:p>
             <a:fld id="{4D0BBA01-C01E-4670-BF37-03B582907E57}" type="datetime1">
               <a:rPr lang="en-IN" smtClean="0"/>
-              <a:t>26-06-2024</a:t>
+              <a:t>27-06-2024</a:t>
             </a:fld>
             <a:endParaRPr lang="en-IN"/>
           </a:p>
@@ -14763,7 +14763,7 @@
           <a:p>
             <a:fld id="{26D88E8E-B885-451A-8404-BB0632FBBD96}" type="datetime1">
               <a:rPr lang="en-IN" smtClean="0"/>
-              <a:t>26-06-2024</a:t>
+              <a:t>27-06-2024</a:t>
             </a:fld>
             <a:endParaRPr lang="en-IN"/>
           </a:p>
@@ -14913,7 +14913,7 @@
           <a:p>
             <a:fld id="{4EAE6060-4FB4-40EE-8D4C-4B4E0D0CB350}" type="datetime1">
               <a:rPr lang="en-IN" smtClean="0"/>
-              <a:t>26-06-2024</a:t>
+              <a:t>27-06-2024</a:t>
             </a:fld>
             <a:endParaRPr lang="en-IN"/>
           </a:p>
@@ -15034,7 +15034,7 @@
           <a:p>
             <a:fld id="{5B095638-D3A4-4096-B879-8725F6D53E01}" type="datetime1">
               <a:rPr lang="en-IN" smtClean="0"/>
-              <a:t>26-06-2024</a:t>
+              <a:t>27-06-2024</a:t>
             </a:fld>
             <a:endParaRPr lang="en-IN"/>
           </a:p>
@@ -15355,7 +15355,7 @@
           <a:p>
             <a:fld id="{6FA226F2-CF21-4C2F-B5D5-FD57CB07C16F}" type="datetime1">
               <a:rPr lang="en-IN" smtClean="0"/>
-              <a:t>26-06-2024</a:t>
+              <a:t>27-06-2024</a:t>
             </a:fld>
             <a:endParaRPr lang="en-IN"/>
           </a:p>
@@ -15652,7 +15652,7 @@
           <a:p>
             <a:fld id="{B010FD39-8D27-4637-B9EB-FD987548BD96}" type="datetime1">
               <a:rPr lang="en-IN" smtClean="0"/>
-              <a:t>26-06-2024</a:t>
+              <a:t>27-06-2024</a:t>
             </a:fld>
             <a:endParaRPr lang="en-IN"/>
           </a:p>
@@ -15903,7 +15903,7 @@
           <a:p>
             <a:fld id="{70846B43-4F1B-420A-937E-3E33F87CAD33}" type="datetime1">
               <a:rPr lang="en-IN" smtClean="0"/>
-              <a:t>26-06-2024</a:t>
+              <a:t>27-06-2024</a:t>
             </a:fld>
             <a:endParaRPr lang="en-IN"/>
           </a:p>
@@ -16482,7 +16482,7 @@
           <a:p>
             <a:fld id="{42E843B1-15B6-4A09-A2AE-9AF40C4132EF}" type="datetime1">
               <a:rPr lang="en-IN" smtClean="0"/>
-              <a:t>26-06-2024</a:t>
+              <a:t>27-06-2024</a:t>
             </a:fld>
             <a:endParaRPr lang="en-IN"/>
           </a:p>

</xml_diff>

<commit_message>
Added population and parameter output
Will add dead nest and individual output after this
</commit_message>
<xml_diff>
--- a/Additional/Presentations/20240626PreExplorationMeeting.pptx
+++ b/Additional/Presentations/20240626PreExplorationMeeting.pptx
@@ -9554,7 +9554,7 @@
           <a:p>
             <a:fld id="{BF5DCE9E-1BB9-422F-BD86-429B81264EA3}" type="datetimeFigureOut">
               <a:rPr lang="en-IN" smtClean="0"/>
-              <a:t>27-06-2024</a:t>
+              <a:t>02-07-2024</a:t>
             </a:fld>
             <a:endParaRPr lang="en-IN"/>
           </a:p>
@@ -10410,7 +10410,7 @@
           <a:p>
             <a:fld id="{53698918-721C-41EB-A543-DCCB4BCD4EE1}" type="datetime1">
               <a:rPr lang="en-IN" smtClean="0"/>
-              <a:t>27-06-2024</a:t>
+              <a:t>02-07-2024</a:t>
             </a:fld>
             <a:endParaRPr lang="en-IN"/>
           </a:p>
@@ -10618,7 +10618,7 @@
           <a:p>
             <a:fld id="{31EAFC2E-7CD5-46D5-9B51-90A0A777C0FB}" type="datetime1">
               <a:rPr lang="en-IN" smtClean="0"/>
-              <a:t>27-06-2024</a:t>
+              <a:t>02-07-2024</a:t>
             </a:fld>
             <a:endParaRPr lang="en-IN"/>
           </a:p>
@@ -10836,7 +10836,7 @@
           <a:p>
             <a:fld id="{21DF4EEF-F77E-4DEF-9D59-E580134A0BFF}" type="datetime1">
               <a:rPr lang="en-IN" smtClean="0"/>
-              <a:t>27-06-2024</a:t>
+              <a:t>02-07-2024</a:t>
             </a:fld>
             <a:endParaRPr lang="en-IN"/>
           </a:p>
@@ -11066,7 +11066,7 @@
           <a:p>
             <a:fld id="{B60A30DB-D3DD-4171-87BA-58EE4B4D9D99}" type="datetime1">
               <a:rPr lang="en-IN" smtClean="0"/>
-              <a:t>27-06-2024</a:t>
+              <a:t>02-07-2024</a:t>
             </a:fld>
             <a:endParaRPr lang="en-IN"/>
           </a:p>
@@ -11274,7 +11274,7 @@
           <a:p>
             <a:fld id="{8FD7C09A-ED8C-42A3-8E89-745F787EBAE6}" type="datetime1">
               <a:rPr lang="en-IN" smtClean="0"/>
-              <a:t>27-06-2024</a:t>
+              <a:t>02-07-2024</a:t>
             </a:fld>
             <a:endParaRPr lang="en-IN"/>
           </a:p>
@@ -11558,7 +11558,7 @@
           <a:p>
             <a:fld id="{080BA975-D9F0-4269-A855-55AF444CC146}" type="datetime1">
               <a:rPr lang="en-IN" smtClean="0"/>
-              <a:t>27-06-2024</a:t>
+              <a:t>02-07-2024</a:t>
             </a:fld>
             <a:endParaRPr lang="en-IN"/>
           </a:p>
@@ -11834,7 +11834,7 @@
           <a:p>
             <a:fld id="{3F2FDCAA-38F5-4F11-8B45-AFF0D48CAE37}" type="datetime1">
               <a:rPr lang="en-IN" smtClean="0"/>
-              <a:t>27-06-2024</a:t>
+              <a:t>02-07-2024</a:t>
             </a:fld>
             <a:endParaRPr lang="en-IN"/>
           </a:p>
@@ -12257,7 +12257,7 @@
           <a:p>
             <a:fld id="{E67CD80F-0809-4D91-A685-81C43EC68BD7}" type="datetime1">
               <a:rPr lang="en-IN" smtClean="0"/>
-              <a:t>27-06-2024</a:t>
+              <a:t>02-07-2024</a:t>
             </a:fld>
             <a:endParaRPr lang="en-IN"/>
           </a:p>
@@ -12407,7 +12407,7 @@
           <a:p>
             <a:fld id="{0000C283-6B90-4B55-96AC-1FEC6760B80A}" type="datetime1">
               <a:rPr lang="en-IN" smtClean="0"/>
-              <a:t>27-06-2024</a:t>
+              <a:t>02-07-2024</a:t>
             </a:fld>
             <a:endParaRPr lang="en-IN"/>
           </a:p>
@@ -12528,7 +12528,7 @@
           <a:p>
             <a:fld id="{8DBD286D-3A68-4404-983E-98E32172149A}" type="datetime1">
               <a:rPr lang="en-IN" smtClean="0"/>
-              <a:t>27-06-2024</a:t>
+              <a:t>02-07-2024</a:t>
             </a:fld>
             <a:endParaRPr lang="en-IN"/>
           </a:p>
@@ -12849,7 +12849,7 @@
           <a:p>
             <a:fld id="{856FFEC3-933E-468C-B098-6AED721D74E5}" type="datetime1">
               <a:rPr lang="en-IN" smtClean="0"/>
-              <a:t>27-06-2024</a:t>
+              <a:t>02-07-2024</a:t>
             </a:fld>
             <a:endParaRPr lang="en-IN"/>
           </a:p>
@@ -13057,7 +13057,7 @@
           <a:p>
             <a:fld id="{7E9D746C-5244-48A8-8BA7-7C87D343C067}" type="datetime1">
               <a:rPr lang="en-IN" smtClean="0"/>
-              <a:t>27-06-2024</a:t>
+              <a:t>02-07-2024</a:t>
             </a:fld>
             <a:endParaRPr lang="en-IN"/>
           </a:p>
@@ -13354,7 +13354,7 @@
           <a:p>
             <a:fld id="{16D845DA-BC95-4479-A4D1-9EC39717A5ED}" type="datetime1">
               <a:rPr lang="en-IN" smtClean="0"/>
-              <a:t>27-06-2024</a:t>
+              <a:t>02-07-2024</a:t>
             </a:fld>
             <a:endParaRPr lang="en-IN"/>
           </a:p>
@@ -13562,7 +13562,7 @@
           <a:p>
             <a:fld id="{2EF65F16-D82D-408B-ACAD-B510466CBCE0}" type="datetime1">
               <a:rPr lang="en-IN" smtClean="0"/>
-              <a:t>27-06-2024</a:t>
+              <a:t>02-07-2024</a:t>
             </a:fld>
             <a:endParaRPr lang="en-IN"/>
           </a:p>
@@ -13780,7 +13780,7 @@
           <a:p>
             <a:fld id="{C11CDA68-76E6-4C65-B5F6-9692920ACB6D}" type="datetime1">
               <a:rPr lang="en-IN" smtClean="0"/>
-              <a:t>27-06-2024</a:t>
+              <a:t>02-07-2024</a:t>
             </a:fld>
             <a:endParaRPr lang="en-IN"/>
           </a:p>
@@ -14064,7 +14064,7 @@
           <a:p>
             <a:fld id="{D09F8160-02F9-4DCC-880C-850EDD8A9CA1}" type="datetime1">
               <a:rPr lang="en-IN" smtClean="0"/>
-              <a:t>27-06-2024</a:t>
+              <a:t>02-07-2024</a:t>
             </a:fld>
             <a:endParaRPr lang="en-IN"/>
           </a:p>
@@ -14340,7 +14340,7 @@
           <a:p>
             <a:fld id="{4D0BBA01-C01E-4670-BF37-03B582907E57}" type="datetime1">
               <a:rPr lang="en-IN" smtClean="0"/>
-              <a:t>27-06-2024</a:t>
+              <a:t>02-07-2024</a:t>
             </a:fld>
             <a:endParaRPr lang="en-IN"/>
           </a:p>
@@ -14763,7 +14763,7 @@
           <a:p>
             <a:fld id="{26D88E8E-B885-451A-8404-BB0632FBBD96}" type="datetime1">
               <a:rPr lang="en-IN" smtClean="0"/>
-              <a:t>27-06-2024</a:t>
+              <a:t>02-07-2024</a:t>
             </a:fld>
             <a:endParaRPr lang="en-IN"/>
           </a:p>
@@ -14913,7 +14913,7 @@
           <a:p>
             <a:fld id="{4EAE6060-4FB4-40EE-8D4C-4B4E0D0CB350}" type="datetime1">
               <a:rPr lang="en-IN" smtClean="0"/>
-              <a:t>27-06-2024</a:t>
+              <a:t>02-07-2024</a:t>
             </a:fld>
             <a:endParaRPr lang="en-IN"/>
           </a:p>
@@ -15034,7 +15034,7 @@
           <a:p>
             <a:fld id="{5B095638-D3A4-4096-B879-8725F6D53E01}" type="datetime1">
               <a:rPr lang="en-IN" smtClean="0"/>
-              <a:t>27-06-2024</a:t>
+              <a:t>02-07-2024</a:t>
             </a:fld>
             <a:endParaRPr lang="en-IN"/>
           </a:p>
@@ -15355,7 +15355,7 @@
           <a:p>
             <a:fld id="{6FA226F2-CF21-4C2F-B5D5-FD57CB07C16F}" type="datetime1">
               <a:rPr lang="en-IN" smtClean="0"/>
-              <a:t>27-06-2024</a:t>
+              <a:t>02-07-2024</a:t>
             </a:fld>
             <a:endParaRPr lang="en-IN"/>
           </a:p>
@@ -15652,7 +15652,7 @@
           <a:p>
             <a:fld id="{B010FD39-8D27-4637-B9EB-FD987548BD96}" type="datetime1">
               <a:rPr lang="en-IN" smtClean="0"/>
-              <a:t>27-06-2024</a:t>
+              <a:t>02-07-2024</a:t>
             </a:fld>
             <a:endParaRPr lang="en-IN"/>
           </a:p>
@@ -15903,7 +15903,7 @@
           <a:p>
             <a:fld id="{70846B43-4F1B-420A-937E-3E33F87CAD33}" type="datetime1">
               <a:rPr lang="en-IN" smtClean="0"/>
-              <a:t>27-06-2024</a:t>
+              <a:t>02-07-2024</a:t>
             </a:fld>
             <a:endParaRPr lang="en-IN"/>
           </a:p>
@@ -16482,7 +16482,7 @@
           <a:p>
             <a:fld id="{42E843B1-15B6-4A09-A2AE-9AF40C4132EF}" type="datetime1">
               <a:rPr lang="en-IN" smtClean="0"/>
-              <a:t>27-06-2024</a:t>
+              <a:t>02-07-2024</a:t>
             </a:fld>
             <a:endParaRPr lang="en-IN"/>
           </a:p>
@@ -21490,7 +21490,7 @@
         <p:spPr>
           <a:xfrm>
             <a:off x="762323" y="2293054"/>
-            <a:ext cx="3112991" cy="3693319"/>
+            <a:ext cx="3112991" cy="4524315"/>
           </a:xfrm>
           <a:prstGeom prst="rect">
             <a:avLst/>
@@ -21622,7 +21622,20 @@
               <a:rPr lang="en-IN" dirty="0" err="1"/>
               <a:t>num_offsprings</a:t>
             </a:r>
-            <a:endParaRPr lang="en-IN" dirty="0"/>
+            <a:br>
+              <a:rPr lang="en-IN" dirty="0"/>
+            </a:br>
+            <a:br>
+              <a:rPr lang="en-IN" dirty="0"/>
+            </a:br>
+            <a:r>
+              <a:rPr lang="en-IN" dirty="0"/>
+              <a:t>-&gt; </a:t>
+            </a:r>
+            <a:r>
+              <a:rPr lang="en-IN" b="1" dirty="0"/>
+              <a:t>Shannon and Simpson of offsprings</a:t>
+            </a:r>
           </a:p>
         </p:txBody>
       </p:sp>
@@ -21641,7 +21654,7 @@
         <p:spPr>
           <a:xfrm>
             <a:off x="4141656" y="2293054"/>
-            <a:ext cx="3112991" cy="3693319"/>
+            <a:ext cx="3112991" cy="4524315"/>
           </a:xfrm>
           <a:prstGeom prst="rect">
             <a:avLst/>
@@ -21782,6 +21795,19 @@
             <a:r>
               <a:rPr lang="en-IN" dirty="0"/>
               <a:t>-&gt; Neutral gene</a:t>
+            </a:r>
+          </a:p>
+          <a:p>
+            <a:br>
+              <a:rPr lang="en-IN" dirty="0"/>
+            </a:br>
+            <a:r>
+              <a:rPr lang="en-IN" dirty="0"/>
+              <a:t>-&gt; </a:t>
+            </a:r>
+            <a:r>
+              <a:rPr lang="en-IN" b="1" dirty="0"/>
+              <a:t>DISTANCE FROM POP average</a:t>
             </a:r>
           </a:p>
         </p:txBody>

</xml_diff>